<commit_message>
- Check 필요 : ERROR Device 주소가 없습니다. F2_CLP_+ F2_CLP_-
</commit_message>
<xml_diff>
--- a/DsDotNet/src/UnitTest/UnitTest.Model/ImportOfficeExample/exportDS/testA/lib/dev.pptx
+++ b/DsDotNet/src/UnitTest/UnitTest.Model/ImportOfficeExample/exportDS/testA/lib/dev.pptx
@@ -7,6 +7,7 @@
   <p:sldIdLst>
     <p:sldId id="256" r:id="rId2"/>
     <p:sldId id="257" r:id="rId3"/>
+    <p:sldId id="258" r:id="rId4"/>
   </p:sldIdLst>
   <p:sldSz cx="12192000" cy="6858000"/>
   <p:notesSz cx="6858000" cy="9144000"/>
@@ -260,7 +261,7 @@
           <a:p>
             <a:fld id="{E31A602F-9409-4B9A-9D14-798E704D8577}" type="datetimeFigureOut">
               <a:rPr lang="ko-KR" altLang="en-US" smtClean="0"/>
-              <a:t>2023-11-02</a:t>
+              <a:t>2023-11-16</a:t>
             </a:fld>
             <a:endParaRPr lang="ko-KR" altLang="en-US"/>
           </a:p>
@@ -458,7 +459,7 @@
           <a:p>
             <a:fld id="{E31A602F-9409-4B9A-9D14-798E704D8577}" type="datetimeFigureOut">
               <a:rPr lang="ko-KR" altLang="en-US" smtClean="0"/>
-              <a:t>2023-11-02</a:t>
+              <a:t>2023-11-16</a:t>
             </a:fld>
             <a:endParaRPr lang="ko-KR" altLang="en-US"/>
           </a:p>
@@ -666,7 +667,7 @@
           <a:p>
             <a:fld id="{E31A602F-9409-4B9A-9D14-798E704D8577}" type="datetimeFigureOut">
               <a:rPr lang="ko-KR" altLang="en-US" smtClean="0"/>
-              <a:t>2023-11-02</a:t>
+              <a:t>2023-11-16</a:t>
             </a:fld>
             <a:endParaRPr lang="ko-KR" altLang="en-US"/>
           </a:p>
@@ -864,7 +865,7 @@
           <a:p>
             <a:fld id="{E31A602F-9409-4B9A-9D14-798E704D8577}" type="datetimeFigureOut">
               <a:rPr lang="ko-KR" altLang="en-US" smtClean="0"/>
-              <a:t>2023-11-02</a:t>
+              <a:t>2023-11-16</a:t>
             </a:fld>
             <a:endParaRPr lang="ko-KR" altLang="en-US"/>
           </a:p>
@@ -1139,7 +1140,7 @@
           <a:p>
             <a:fld id="{E31A602F-9409-4B9A-9D14-798E704D8577}" type="datetimeFigureOut">
               <a:rPr lang="ko-KR" altLang="en-US" smtClean="0"/>
-              <a:t>2023-11-02</a:t>
+              <a:t>2023-11-16</a:t>
             </a:fld>
             <a:endParaRPr lang="ko-KR" altLang="en-US"/>
           </a:p>
@@ -1404,7 +1405,7 @@
           <a:p>
             <a:fld id="{E31A602F-9409-4B9A-9D14-798E704D8577}" type="datetimeFigureOut">
               <a:rPr lang="ko-KR" altLang="en-US" smtClean="0"/>
-              <a:t>2023-11-02</a:t>
+              <a:t>2023-11-16</a:t>
             </a:fld>
             <a:endParaRPr lang="ko-KR" altLang="en-US"/>
           </a:p>
@@ -1816,7 +1817,7 @@
           <a:p>
             <a:fld id="{E31A602F-9409-4B9A-9D14-798E704D8577}" type="datetimeFigureOut">
               <a:rPr lang="ko-KR" altLang="en-US" smtClean="0"/>
-              <a:t>2023-11-02</a:t>
+              <a:t>2023-11-16</a:t>
             </a:fld>
             <a:endParaRPr lang="ko-KR" altLang="en-US"/>
           </a:p>
@@ -1957,7 +1958,7 @@
           <a:p>
             <a:fld id="{E31A602F-9409-4B9A-9D14-798E704D8577}" type="datetimeFigureOut">
               <a:rPr lang="ko-KR" altLang="en-US" smtClean="0"/>
-              <a:t>2023-11-02</a:t>
+              <a:t>2023-11-16</a:t>
             </a:fld>
             <a:endParaRPr lang="ko-KR" altLang="en-US"/>
           </a:p>
@@ -2070,7 +2071,7 @@
           <a:p>
             <a:fld id="{E31A602F-9409-4B9A-9D14-798E704D8577}" type="datetimeFigureOut">
               <a:rPr lang="ko-KR" altLang="en-US" smtClean="0"/>
-              <a:t>2023-11-02</a:t>
+              <a:t>2023-11-16</a:t>
             </a:fld>
             <a:endParaRPr lang="ko-KR" altLang="en-US"/>
           </a:p>
@@ -2381,7 +2382,7 @@
           <a:p>
             <a:fld id="{E31A602F-9409-4B9A-9D14-798E704D8577}" type="datetimeFigureOut">
               <a:rPr lang="ko-KR" altLang="en-US" smtClean="0"/>
-              <a:t>2023-11-02</a:t>
+              <a:t>2023-11-16</a:t>
             </a:fld>
             <a:endParaRPr lang="ko-KR" altLang="en-US"/>
           </a:p>
@@ -2669,7 +2670,7 @@
           <a:p>
             <a:fld id="{E31A602F-9409-4B9A-9D14-798E704D8577}" type="datetimeFigureOut">
               <a:rPr lang="ko-KR" altLang="en-US" smtClean="0"/>
-              <a:t>2023-11-02</a:t>
+              <a:t>2023-11-16</a:t>
             </a:fld>
             <a:endParaRPr lang="ko-KR" altLang="en-US"/>
           </a:p>
@@ -2910,7 +2911,7 @@
           <a:p>
             <a:fld id="{E31A602F-9409-4B9A-9D14-798E704D8577}" type="datetimeFigureOut">
               <a:rPr lang="ko-KR" altLang="en-US" smtClean="0"/>
-              <a:t>2023-11-02</a:t>
+              <a:t>2023-11-16</a:t>
             </a:fld>
             <a:endParaRPr lang="ko-KR" altLang="en-US"/>
           </a:p>
@@ -3944,6 +3945,1166 @@
 </p:sld>
 </file>
 
+<file path=ppt/slides/slide3.xml><?xml version="1.0" encoding="utf-8"?>
+<p:sld xmlns:a="http://schemas.openxmlformats.org/drawingml/2006/main" xmlns:r="http://schemas.openxmlformats.org/officeDocument/2006/relationships" xmlns:p="http://schemas.openxmlformats.org/presentationml/2006/main">
+  <p:cSld>
+    <p:bg>
+      <p:bgPr>
+        <a:solidFill>
+          <a:srgbClr val="FFFFFF"/>
+        </a:solidFill>
+        <a:effectLst/>
+      </p:bgPr>
+    </p:bg>
+    <p:spTree>
+      <p:nvGrpSpPr>
+        <p:cNvPr id="1" name=""/>
+        <p:cNvGrpSpPr/>
+        <p:nvPr/>
+      </p:nvGrpSpPr>
+      <p:grpSpPr>
+        <a:xfrm>
+          <a:off x="0" y="0"/>
+          <a:ext cx="0" cy="0"/>
+          <a:chOff x="0" y="0"/>
+          <a:chExt cx="0" cy="0"/>
+        </a:xfrm>
+      </p:grpSpPr>
+      <p:sp>
+        <p:nvSpPr>
+          <p:cNvPr id="2" name="TextBox 1">
+            <a:extLst>
+              <a:ext uri="{FF2B5EF4-FFF2-40B4-BE49-F238E27FC236}">
+                <a16:creationId xmlns:a16="http://schemas.microsoft.com/office/drawing/2014/main" id="{E53DB8F4-321C-67CD-CFBC-2129F6BAE50C}"/>
+              </a:ext>
+            </a:extLst>
+          </p:cNvPr>
+          <p:cNvSpPr txBox="1"/>
+          <p:nvPr/>
+        </p:nvSpPr>
+        <p:spPr>
+          <a:xfrm>
+            <a:off x="254000" y="254000"/>
+            <a:ext cx="1270000" cy="381000"/>
+          </a:xfrm>
+          <a:prstGeom prst="rect">
+            <a:avLst/>
+          </a:prstGeom>
+          <a:noFill/>
+        </p:spPr>
+        <p:txBody>
+          <a:bodyPr vert="horz" rtlCol="0">
+            <a:spAutoFit/>
+          </a:bodyPr>
+          <a:lstStyle/>
+          <a:p>
+            <a:r>
+              <a:rPr lang="en-US" altLang="ko-KR"/>
+              <a:t>IO TABLE</a:t>
+            </a:r>
+            <a:endParaRPr lang="ko-KR" altLang="en-US"/>
+          </a:p>
+        </p:txBody>
+      </p:sp>
+      <p:graphicFrame>
+        <p:nvGraphicFramePr>
+          <p:cNvPr id="3" name="표 2">
+            <a:extLst>
+              <a:ext uri="{FF2B5EF4-FFF2-40B4-BE49-F238E27FC236}">
+                <a16:creationId xmlns:a16="http://schemas.microsoft.com/office/drawing/2014/main" id="{69FF3AA1-4AEA-AC0D-0191-9F224EDD4D8F}"/>
+              </a:ext>
+            </a:extLst>
+          </p:cNvPr>
+          <p:cNvGraphicFramePr>
+            <a:graphicFrameLocks noGrp="1"/>
+          </p:cNvGraphicFramePr>
+          <p:nvPr>
+            <p:extLst>
+              <p:ext uri="{D42A27DB-BD31-4B8C-83A1-F6EECF244321}">
+                <p14:modId xmlns:p14="http://schemas.microsoft.com/office/powerpoint/2010/main" val="3713870498"/>
+              </p:ext>
+            </p:extLst>
+          </p:nvPr>
+        </p:nvGraphicFramePr>
+        <p:xfrm>
+          <a:off x="254000" y="635000"/>
+          <a:ext cx="11684001" cy="3916680"/>
+        </p:xfrm>
+        <a:graphic>
+          <a:graphicData uri="http://schemas.openxmlformats.org/drawingml/2006/table">
+            <a:tbl>
+              <a:tblPr firstRow="1" bandRow="1">
+                <a:tableStyleId>{5C22544A-7EE6-4342-B048-85BDC9FD1C3A}</a:tableStyleId>
+              </a:tblPr>
+              <a:tblGrid>
+                <a:gridCol w="1669143">
+                  <a:extLst>
+                    <a:ext uri="{9D8B030D-6E8A-4147-A177-3AD203B41FA5}">
+                      <a16:colId xmlns:a16="http://schemas.microsoft.com/office/drawing/2014/main" val="1560428702"/>
+                    </a:ext>
+                  </a:extLst>
+                </a:gridCol>
+                <a:gridCol w="1669143">
+                  <a:extLst>
+                    <a:ext uri="{9D8B030D-6E8A-4147-A177-3AD203B41FA5}">
+                      <a16:colId xmlns:a16="http://schemas.microsoft.com/office/drawing/2014/main" val="2322258838"/>
+                    </a:ext>
+                  </a:extLst>
+                </a:gridCol>
+                <a:gridCol w="1669143">
+                  <a:extLst>
+                    <a:ext uri="{9D8B030D-6E8A-4147-A177-3AD203B41FA5}">
+                      <a16:colId xmlns:a16="http://schemas.microsoft.com/office/drawing/2014/main" val="2209410442"/>
+                    </a:ext>
+                  </a:extLst>
+                </a:gridCol>
+                <a:gridCol w="1669143">
+                  <a:extLst>
+                    <a:ext uri="{9D8B030D-6E8A-4147-A177-3AD203B41FA5}">
+                      <a16:colId xmlns:a16="http://schemas.microsoft.com/office/drawing/2014/main" val="741026842"/>
+                    </a:ext>
+                  </a:extLst>
+                </a:gridCol>
+                <a:gridCol w="1669143">
+                  <a:extLst>
+                    <a:ext uri="{9D8B030D-6E8A-4147-A177-3AD203B41FA5}">
+                      <a16:colId xmlns:a16="http://schemas.microsoft.com/office/drawing/2014/main" val="4068080558"/>
+                    </a:ext>
+                  </a:extLst>
+                </a:gridCol>
+                <a:gridCol w="1669143">
+                  <a:extLst>
+                    <a:ext uri="{9D8B030D-6E8A-4147-A177-3AD203B41FA5}">
+                      <a16:colId xmlns:a16="http://schemas.microsoft.com/office/drawing/2014/main" val="2345341009"/>
+                    </a:ext>
+                  </a:extLst>
+                </a:gridCol>
+                <a:gridCol w="1669143">
+                  <a:extLst>
+                    <a:ext uri="{9D8B030D-6E8A-4147-A177-3AD203B41FA5}">
+                      <a16:colId xmlns:a16="http://schemas.microsoft.com/office/drawing/2014/main" val="4019820202"/>
+                    </a:ext>
+                  </a:extLst>
+                </a:gridCol>
+              </a:tblGrid>
+              <a:tr h="0">
+                <a:tc>
+                  <a:txBody>
+                    <a:bodyPr/>
+                    <a:lstStyle/>
+                    <a:p>
+                      <a:pPr latinLnBrk="1"/>
+                      <a:r>
+                        <a:rPr lang="en-US" altLang="ko-KR" sz="1100"/>
+                        <a:t>Case</a:t>
+                      </a:r>
+                      <a:endParaRPr lang="ko-KR" altLang="en-US" sz="1100"/>
+                    </a:p>
+                  </a:txBody>
+                  <a:tcPr/>
+                </a:tc>
+                <a:tc>
+                  <a:txBody>
+                    <a:bodyPr/>
+                    <a:lstStyle/>
+                    <a:p>
+                      <a:pPr latinLnBrk="1"/>
+                      <a:r>
+                        <a:rPr lang="en-US" altLang="ko-KR" sz="1100"/>
+                        <a:t>Name</a:t>
+                      </a:r>
+                      <a:endParaRPr lang="ko-KR" altLang="en-US" sz="1100"/>
+                    </a:p>
+                  </a:txBody>
+                  <a:tcPr/>
+                </a:tc>
+                <a:tc>
+                  <a:txBody>
+                    <a:bodyPr/>
+                    <a:lstStyle/>
+                    <a:p>
+                      <a:pPr latinLnBrk="1"/>
+                      <a:r>
+                        <a:rPr lang="en-US" altLang="ko-KR" sz="1100"/>
+                        <a:t>DataType</a:t>
+                      </a:r>
+                      <a:endParaRPr lang="ko-KR" altLang="en-US" sz="1100"/>
+                    </a:p>
+                  </a:txBody>
+                  <a:tcPr/>
+                </a:tc>
+                <a:tc>
+                  <a:txBody>
+                    <a:bodyPr/>
+                    <a:lstStyle/>
+                    <a:p>
+                      <a:pPr latinLnBrk="1"/>
+                      <a:r>
+                        <a:rPr lang="en-US" altLang="ko-KR" sz="1100"/>
+                        <a:t>Input</a:t>
+                      </a:r>
+                      <a:endParaRPr lang="ko-KR" altLang="en-US" sz="1100"/>
+                    </a:p>
+                  </a:txBody>
+                  <a:tcPr/>
+                </a:tc>
+                <a:tc>
+                  <a:txBody>
+                    <a:bodyPr/>
+                    <a:lstStyle/>
+                    <a:p>
+                      <a:pPr latinLnBrk="1"/>
+                      <a:r>
+                        <a:rPr lang="en-US" altLang="ko-KR" sz="1100"/>
+                        <a:t>Output</a:t>
+                      </a:r>
+                      <a:endParaRPr lang="ko-KR" altLang="en-US" sz="1100"/>
+                    </a:p>
+                  </a:txBody>
+                  <a:tcPr/>
+                </a:tc>
+                <a:tc>
+                  <a:txBody>
+                    <a:bodyPr/>
+                    <a:lstStyle/>
+                    <a:p>
+                      <a:pPr latinLnBrk="1"/>
+                      <a:r>
+                        <a:rPr lang="en-US" altLang="ko-KR" sz="1100"/>
+                        <a:t>Job</a:t>
+                      </a:r>
+                      <a:endParaRPr lang="ko-KR" altLang="en-US" sz="1100"/>
+                    </a:p>
+                  </a:txBody>
+                  <a:tcPr/>
+                </a:tc>
+                <a:tc>
+                  <a:txBody>
+                    <a:bodyPr/>
+                    <a:lstStyle/>
+                    <a:p>
+                      <a:pPr latinLnBrk="1"/>
+                      <a:r>
+                        <a:rPr lang="en-US" altLang="ko-KR" sz="1100"/>
+                        <a:t>Func</a:t>
+                      </a:r>
+                      <a:endParaRPr lang="ko-KR" altLang="en-US" sz="1100"/>
+                    </a:p>
+                  </a:txBody>
+                  <a:tcPr/>
+                </a:tc>
+                <a:extLst>
+                  <a:ext uri="{0D108BD9-81ED-4DB2-BD59-A6C34878D82A}">
+                    <a16:rowId xmlns:a16="http://schemas.microsoft.com/office/drawing/2014/main" val="2063689300"/>
+                  </a:ext>
+                </a:extLst>
+              </a:tr>
+              <a:tr h="0">
+                <a:tc>
+                  <a:txBody>
+                    <a:bodyPr/>
+                    <a:lstStyle/>
+                    <a:p>
+                      <a:pPr latinLnBrk="1"/>
+                      <a:r>
+                        <a:rPr lang="ko-KR" altLang="en-US" sz="1100"/>
+                        <a:t>외부주소</a:t>
+                      </a:r>
+                    </a:p>
+                  </a:txBody>
+                  <a:tcPr/>
+                </a:tc>
+                <a:tc>
+                  <a:txBody>
+                    <a:bodyPr/>
+                    <a:lstStyle/>
+                    <a:p>
+                      <a:pPr latinLnBrk="1"/>
+                      <a:r>
+                        <a:rPr lang="en-US" altLang="ko-KR" sz="1100"/>
+                        <a:t>F2_CLP."+"</a:t>
+                      </a:r>
+                      <a:endParaRPr lang="ko-KR" altLang="en-US" sz="1100"/>
+                    </a:p>
+                  </a:txBody>
+                  <a:tcPr/>
+                </a:tc>
+                <a:tc>
+                  <a:txBody>
+                    <a:bodyPr/>
+                    <a:lstStyle/>
+                    <a:p>
+                      <a:pPr latinLnBrk="1"/>
+                      <a:r>
+                        <a:rPr lang="en-US" altLang="ko-KR" sz="1100"/>
+                        <a:t>bool</a:t>
+                      </a:r>
+                      <a:endParaRPr lang="ko-KR" altLang="en-US" sz="1100"/>
+                    </a:p>
+                  </a:txBody>
+                  <a:tcPr/>
+                </a:tc>
+                <a:tc>
+                  <a:txBody>
+                    <a:bodyPr/>
+                    <a:lstStyle/>
+                    <a:p>
+                      <a:pPr latinLnBrk="1"/>
+                      <a:r>
+                        <a:rPr lang="en-US" altLang="ko-KR" sz="1100"/>
+                        <a:t>I625.1</a:t>
+                      </a:r>
+                      <a:endParaRPr lang="ko-KR" altLang="en-US" sz="1100"/>
+                    </a:p>
+                  </a:txBody>
+                  <a:tcPr/>
+                </a:tc>
+                <a:tc>
+                  <a:txBody>
+                    <a:bodyPr/>
+                    <a:lstStyle/>
+                    <a:p>
+                      <a:pPr latinLnBrk="1"/>
+                      <a:r>
+                        <a:rPr lang="en-US" altLang="ko-KR" sz="1100"/>
+                        <a:t>O625.1</a:t>
+                      </a:r>
+                      <a:endParaRPr lang="ko-KR" altLang="en-US" sz="1100"/>
+                    </a:p>
+                  </a:txBody>
+                  <a:tcPr/>
+                </a:tc>
+                <a:tc>
+                  <a:txBody>
+                    <a:bodyPr/>
+                    <a:lstStyle/>
+                    <a:p>
+                      <a:pPr latinLnBrk="1"/>
+                      <a:r>
+                        <a:rPr lang="en-US" altLang="ko-KR" sz="1100"/>
+                        <a:t>F2_CLP_+</a:t>
+                      </a:r>
+                      <a:endParaRPr lang="ko-KR" altLang="en-US" sz="1100"/>
+                    </a:p>
+                  </a:txBody>
+                  <a:tcPr/>
+                </a:tc>
+                <a:tc>
+                  <a:txBody>
+                    <a:bodyPr/>
+                    <a:lstStyle/>
+                    <a:p>
+                      <a:pPr latinLnBrk="1"/>
+                      <a:endParaRPr lang="ko-KR" altLang="en-US" sz="1100"/>
+                    </a:p>
+                  </a:txBody>
+                  <a:tcPr/>
+                </a:tc>
+                <a:extLst>
+                  <a:ext uri="{0D108BD9-81ED-4DB2-BD59-A6C34878D82A}">
+                    <a16:rowId xmlns:a16="http://schemas.microsoft.com/office/drawing/2014/main" val="3014701424"/>
+                  </a:ext>
+                </a:extLst>
+              </a:tr>
+              <a:tr h="0">
+                <a:tc>
+                  <a:txBody>
+                    <a:bodyPr/>
+                    <a:lstStyle/>
+                    <a:p>
+                      <a:pPr latinLnBrk="1"/>
+                      <a:r>
+                        <a:rPr lang="ko-KR" altLang="en-US" sz="1100"/>
+                        <a:t>외부주소</a:t>
+                      </a:r>
+                    </a:p>
+                  </a:txBody>
+                  <a:tcPr/>
+                </a:tc>
+                <a:tc>
+                  <a:txBody>
+                    <a:bodyPr/>
+                    <a:lstStyle/>
+                    <a:p>
+                      <a:pPr latinLnBrk="1"/>
+                      <a:r>
+                        <a:rPr lang="en-US" altLang="ko-KR" sz="1100"/>
+                        <a:t>F2_CLP."-"</a:t>
+                      </a:r>
+                      <a:endParaRPr lang="ko-KR" altLang="en-US" sz="1100"/>
+                    </a:p>
+                  </a:txBody>
+                  <a:tcPr/>
+                </a:tc>
+                <a:tc>
+                  <a:txBody>
+                    <a:bodyPr/>
+                    <a:lstStyle/>
+                    <a:p>
+                      <a:pPr latinLnBrk="1"/>
+                      <a:r>
+                        <a:rPr lang="en-US" altLang="ko-KR" sz="1100"/>
+                        <a:t>bool</a:t>
+                      </a:r>
+                      <a:endParaRPr lang="ko-KR" altLang="en-US" sz="1100"/>
+                    </a:p>
+                  </a:txBody>
+                  <a:tcPr/>
+                </a:tc>
+                <a:tc>
+                  <a:txBody>
+                    <a:bodyPr/>
+                    <a:lstStyle/>
+                    <a:p>
+                      <a:pPr latinLnBrk="1"/>
+                      <a:r>
+                        <a:rPr lang="en-US" altLang="ko-KR" sz="1100"/>
+                        <a:t>I625.2</a:t>
+                      </a:r>
+                      <a:endParaRPr lang="ko-KR" altLang="en-US" sz="1100"/>
+                    </a:p>
+                  </a:txBody>
+                  <a:tcPr/>
+                </a:tc>
+                <a:tc>
+                  <a:txBody>
+                    <a:bodyPr/>
+                    <a:lstStyle/>
+                    <a:p>
+                      <a:pPr latinLnBrk="1"/>
+                      <a:r>
+                        <a:rPr lang="en-US" altLang="ko-KR" sz="1100"/>
+                        <a:t>O625.2</a:t>
+                      </a:r>
+                      <a:endParaRPr lang="ko-KR" altLang="en-US" sz="1100"/>
+                    </a:p>
+                  </a:txBody>
+                  <a:tcPr/>
+                </a:tc>
+                <a:tc>
+                  <a:txBody>
+                    <a:bodyPr/>
+                    <a:lstStyle/>
+                    <a:p>
+                      <a:pPr latinLnBrk="1"/>
+                      <a:r>
+                        <a:rPr lang="en-US" altLang="ko-KR" sz="1100"/>
+                        <a:t>F2_CLP_-</a:t>
+                      </a:r>
+                      <a:endParaRPr lang="ko-KR" altLang="en-US" sz="1100"/>
+                    </a:p>
+                  </a:txBody>
+                  <a:tcPr/>
+                </a:tc>
+                <a:tc>
+                  <a:txBody>
+                    <a:bodyPr/>
+                    <a:lstStyle/>
+                    <a:p>
+                      <a:pPr latinLnBrk="1"/>
+                      <a:endParaRPr lang="ko-KR" altLang="en-US" sz="1100"/>
+                    </a:p>
+                  </a:txBody>
+                  <a:tcPr/>
+                </a:tc>
+                <a:extLst>
+                  <a:ext uri="{0D108BD9-81ED-4DB2-BD59-A6C34878D82A}">
+                    <a16:rowId xmlns:a16="http://schemas.microsoft.com/office/drawing/2014/main" val="2658622021"/>
+                  </a:ext>
+                </a:extLst>
+              </a:tr>
+              <a:tr h="0">
+                <a:tc>
+                  <a:txBody>
+                    <a:bodyPr/>
+                    <a:lstStyle/>
+                    <a:p>
+                      <a:pPr latinLnBrk="1"/>
+                      <a:endParaRPr lang="ko-KR" altLang="en-US" sz="1100"/>
+                    </a:p>
+                  </a:txBody>
+                  <a:tcPr/>
+                </a:tc>
+                <a:tc>
+                  <a:txBody>
+                    <a:bodyPr/>
+                    <a:lstStyle/>
+                    <a:p>
+                      <a:pPr latinLnBrk="1"/>
+                      <a:endParaRPr lang="ko-KR" altLang="en-US" sz="1100"/>
+                    </a:p>
+                  </a:txBody>
+                  <a:tcPr/>
+                </a:tc>
+                <a:tc>
+                  <a:txBody>
+                    <a:bodyPr/>
+                    <a:lstStyle/>
+                    <a:p>
+                      <a:pPr latinLnBrk="1"/>
+                      <a:endParaRPr lang="ko-KR" altLang="en-US" sz="1100"/>
+                    </a:p>
+                  </a:txBody>
+                  <a:tcPr/>
+                </a:tc>
+                <a:tc>
+                  <a:txBody>
+                    <a:bodyPr/>
+                    <a:lstStyle/>
+                    <a:p>
+                      <a:pPr latinLnBrk="1"/>
+                      <a:endParaRPr lang="ko-KR" altLang="en-US" sz="1100"/>
+                    </a:p>
+                  </a:txBody>
+                  <a:tcPr/>
+                </a:tc>
+                <a:tc>
+                  <a:txBody>
+                    <a:bodyPr/>
+                    <a:lstStyle/>
+                    <a:p>
+                      <a:pPr latinLnBrk="1"/>
+                      <a:endParaRPr lang="ko-KR" altLang="en-US" sz="1100"/>
+                    </a:p>
+                  </a:txBody>
+                  <a:tcPr/>
+                </a:tc>
+                <a:tc>
+                  <a:txBody>
+                    <a:bodyPr/>
+                    <a:lstStyle/>
+                    <a:p>
+                      <a:pPr latinLnBrk="1"/>
+                      <a:endParaRPr lang="ko-KR" altLang="en-US" sz="1100"/>
+                    </a:p>
+                  </a:txBody>
+                  <a:tcPr/>
+                </a:tc>
+                <a:tc>
+                  <a:txBody>
+                    <a:bodyPr/>
+                    <a:lstStyle/>
+                    <a:p>
+                      <a:pPr latinLnBrk="1"/>
+                      <a:endParaRPr lang="ko-KR" altLang="en-US" sz="1100"/>
+                    </a:p>
+                  </a:txBody>
+                  <a:tcPr/>
+                </a:tc>
+                <a:extLst>
+                  <a:ext uri="{0D108BD9-81ED-4DB2-BD59-A6C34878D82A}">
+                    <a16:rowId xmlns:a16="http://schemas.microsoft.com/office/drawing/2014/main" val="3479657772"/>
+                  </a:ext>
+                </a:extLst>
+              </a:tr>
+              <a:tr h="0">
+                <a:tc>
+                  <a:txBody>
+                    <a:bodyPr/>
+                    <a:lstStyle/>
+                    <a:p>
+                      <a:pPr latinLnBrk="1"/>
+                      <a:endParaRPr lang="ko-KR" altLang="en-US" sz="1100"/>
+                    </a:p>
+                  </a:txBody>
+                  <a:tcPr/>
+                </a:tc>
+                <a:tc>
+                  <a:txBody>
+                    <a:bodyPr/>
+                    <a:lstStyle/>
+                    <a:p>
+                      <a:pPr latinLnBrk="1"/>
+                      <a:endParaRPr lang="ko-KR" altLang="en-US" sz="1100"/>
+                    </a:p>
+                  </a:txBody>
+                  <a:tcPr/>
+                </a:tc>
+                <a:tc>
+                  <a:txBody>
+                    <a:bodyPr/>
+                    <a:lstStyle/>
+                    <a:p>
+                      <a:pPr latinLnBrk="1"/>
+                      <a:endParaRPr lang="ko-KR" altLang="en-US" sz="1100"/>
+                    </a:p>
+                  </a:txBody>
+                  <a:tcPr/>
+                </a:tc>
+                <a:tc>
+                  <a:txBody>
+                    <a:bodyPr/>
+                    <a:lstStyle/>
+                    <a:p>
+                      <a:pPr latinLnBrk="1"/>
+                      <a:endParaRPr lang="ko-KR" altLang="en-US" sz="1100"/>
+                    </a:p>
+                  </a:txBody>
+                  <a:tcPr/>
+                </a:tc>
+                <a:tc>
+                  <a:txBody>
+                    <a:bodyPr/>
+                    <a:lstStyle/>
+                    <a:p>
+                      <a:pPr latinLnBrk="1"/>
+                      <a:endParaRPr lang="ko-KR" altLang="en-US" sz="1100"/>
+                    </a:p>
+                  </a:txBody>
+                  <a:tcPr/>
+                </a:tc>
+                <a:tc>
+                  <a:txBody>
+                    <a:bodyPr/>
+                    <a:lstStyle/>
+                    <a:p>
+                      <a:pPr latinLnBrk="1"/>
+                      <a:endParaRPr lang="ko-KR" altLang="en-US" sz="1100"/>
+                    </a:p>
+                  </a:txBody>
+                  <a:tcPr/>
+                </a:tc>
+                <a:tc>
+                  <a:txBody>
+                    <a:bodyPr/>
+                    <a:lstStyle/>
+                    <a:p>
+                      <a:pPr latinLnBrk="1"/>
+                      <a:endParaRPr lang="ko-KR" altLang="en-US" sz="1100"/>
+                    </a:p>
+                  </a:txBody>
+                  <a:tcPr/>
+                </a:tc>
+                <a:extLst>
+                  <a:ext uri="{0D108BD9-81ED-4DB2-BD59-A6C34878D82A}">
+                    <a16:rowId xmlns:a16="http://schemas.microsoft.com/office/drawing/2014/main" val="4106308594"/>
+                  </a:ext>
+                </a:extLst>
+              </a:tr>
+              <a:tr h="0">
+                <a:tc>
+                  <a:txBody>
+                    <a:bodyPr/>
+                    <a:lstStyle/>
+                    <a:p>
+                      <a:pPr latinLnBrk="1"/>
+                      <a:endParaRPr lang="ko-KR" altLang="en-US" sz="1100"/>
+                    </a:p>
+                  </a:txBody>
+                  <a:tcPr/>
+                </a:tc>
+                <a:tc>
+                  <a:txBody>
+                    <a:bodyPr/>
+                    <a:lstStyle/>
+                    <a:p>
+                      <a:pPr latinLnBrk="1"/>
+                      <a:endParaRPr lang="ko-KR" altLang="en-US" sz="1100"/>
+                    </a:p>
+                  </a:txBody>
+                  <a:tcPr/>
+                </a:tc>
+                <a:tc>
+                  <a:txBody>
+                    <a:bodyPr/>
+                    <a:lstStyle/>
+                    <a:p>
+                      <a:pPr latinLnBrk="1"/>
+                      <a:endParaRPr lang="ko-KR" altLang="en-US" sz="1100"/>
+                    </a:p>
+                  </a:txBody>
+                  <a:tcPr/>
+                </a:tc>
+                <a:tc>
+                  <a:txBody>
+                    <a:bodyPr/>
+                    <a:lstStyle/>
+                    <a:p>
+                      <a:pPr latinLnBrk="1"/>
+                      <a:endParaRPr lang="ko-KR" altLang="en-US" sz="1100"/>
+                    </a:p>
+                  </a:txBody>
+                  <a:tcPr/>
+                </a:tc>
+                <a:tc>
+                  <a:txBody>
+                    <a:bodyPr/>
+                    <a:lstStyle/>
+                    <a:p>
+                      <a:pPr latinLnBrk="1"/>
+                      <a:endParaRPr lang="ko-KR" altLang="en-US" sz="1100"/>
+                    </a:p>
+                  </a:txBody>
+                  <a:tcPr/>
+                </a:tc>
+                <a:tc>
+                  <a:txBody>
+                    <a:bodyPr/>
+                    <a:lstStyle/>
+                    <a:p>
+                      <a:pPr latinLnBrk="1"/>
+                      <a:endParaRPr lang="ko-KR" altLang="en-US" sz="1100"/>
+                    </a:p>
+                  </a:txBody>
+                  <a:tcPr/>
+                </a:tc>
+                <a:tc>
+                  <a:txBody>
+                    <a:bodyPr/>
+                    <a:lstStyle/>
+                    <a:p>
+                      <a:pPr latinLnBrk="1"/>
+                      <a:endParaRPr lang="ko-KR" altLang="en-US" sz="1100"/>
+                    </a:p>
+                  </a:txBody>
+                  <a:tcPr/>
+                </a:tc>
+                <a:extLst>
+                  <a:ext uri="{0D108BD9-81ED-4DB2-BD59-A6C34878D82A}">
+                    <a16:rowId xmlns:a16="http://schemas.microsoft.com/office/drawing/2014/main" val="1336343278"/>
+                  </a:ext>
+                </a:extLst>
+              </a:tr>
+              <a:tr h="0">
+                <a:tc>
+                  <a:txBody>
+                    <a:bodyPr/>
+                    <a:lstStyle/>
+                    <a:p>
+                      <a:pPr latinLnBrk="1"/>
+                      <a:endParaRPr lang="ko-KR" altLang="en-US" sz="1100"/>
+                    </a:p>
+                  </a:txBody>
+                  <a:tcPr/>
+                </a:tc>
+                <a:tc>
+                  <a:txBody>
+                    <a:bodyPr/>
+                    <a:lstStyle/>
+                    <a:p>
+                      <a:pPr latinLnBrk="1"/>
+                      <a:endParaRPr lang="ko-KR" altLang="en-US" sz="1100"/>
+                    </a:p>
+                  </a:txBody>
+                  <a:tcPr/>
+                </a:tc>
+                <a:tc>
+                  <a:txBody>
+                    <a:bodyPr/>
+                    <a:lstStyle/>
+                    <a:p>
+                      <a:pPr latinLnBrk="1"/>
+                      <a:endParaRPr lang="ko-KR" altLang="en-US" sz="1100"/>
+                    </a:p>
+                  </a:txBody>
+                  <a:tcPr/>
+                </a:tc>
+                <a:tc>
+                  <a:txBody>
+                    <a:bodyPr/>
+                    <a:lstStyle/>
+                    <a:p>
+                      <a:pPr latinLnBrk="1"/>
+                      <a:endParaRPr lang="ko-KR" altLang="en-US" sz="1100"/>
+                    </a:p>
+                  </a:txBody>
+                  <a:tcPr/>
+                </a:tc>
+                <a:tc>
+                  <a:txBody>
+                    <a:bodyPr/>
+                    <a:lstStyle/>
+                    <a:p>
+                      <a:pPr latinLnBrk="1"/>
+                      <a:endParaRPr lang="ko-KR" altLang="en-US" sz="1100"/>
+                    </a:p>
+                  </a:txBody>
+                  <a:tcPr/>
+                </a:tc>
+                <a:tc>
+                  <a:txBody>
+                    <a:bodyPr/>
+                    <a:lstStyle/>
+                    <a:p>
+                      <a:pPr latinLnBrk="1"/>
+                      <a:endParaRPr lang="ko-KR" altLang="en-US" sz="1100"/>
+                    </a:p>
+                  </a:txBody>
+                  <a:tcPr/>
+                </a:tc>
+                <a:tc>
+                  <a:txBody>
+                    <a:bodyPr/>
+                    <a:lstStyle/>
+                    <a:p>
+                      <a:pPr latinLnBrk="1"/>
+                      <a:endParaRPr lang="ko-KR" altLang="en-US" sz="1100"/>
+                    </a:p>
+                  </a:txBody>
+                  <a:tcPr/>
+                </a:tc>
+                <a:extLst>
+                  <a:ext uri="{0D108BD9-81ED-4DB2-BD59-A6C34878D82A}">
+                    <a16:rowId xmlns:a16="http://schemas.microsoft.com/office/drawing/2014/main" val="3759111006"/>
+                  </a:ext>
+                </a:extLst>
+              </a:tr>
+              <a:tr h="0">
+                <a:tc>
+                  <a:txBody>
+                    <a:bodyPr/>
+                    <a:lstStyle/>
+                    <a:p>
+                      <a:pPr latinLnBrk="1"/>
+                      <a:endParaRPr lang="ko-KR" altLang="en-US" sz="1100"/>
+                    </a:p>
+                  </a:txBody>
+                  <a:tcPr/>
+                </a:tc>
+                <a:tc>
+                  <a:txBody>
+                    <a:bodyPr/>
+                    <a:lstStyle/>
+                    <a:p>
+                      <a:pPr latinLnBrk="1"/>
+                      <a:endParaRPr lang="ko-KR" altLang="en-US" sz="1100"/>
+                    </a:p>
+                  </a:txBody>
+                  <a:tcPr/>
+                </a:tc>
+                <a:tc>
+                  <a:txBody>
+                    <a:bodyPr/>
+                    <a:lstStyle/>
+                    <a:p>
+                      <a:pPr latinLnBrk="1"/>
+                      <a:endParaRPr lang="ko-KR" altLang="en-US" sz="1100"/>
+                    </a:p>
+                  </a:txBody>
+                  <a:tcPr/>
+                </a:tc>
+                <a:tc>
+                  <a:txBody>
+                    <a:bodyPr/>
+                    <a:lstStyle/>
+                    <a:p>
+                      <a:pPr latinLnBrk="1"/>
+                      <a:endParaRPr lang="ko-KR" altLang="en-US" sz="1100"/>
+                    </a:p>
+                  </a:txBody>
+                  <a:tcPr/>
+                </a:tc>
+                <a:tc>
+                  <a:txBody>
+                    <a:bodyPr/>
+                    <a:lstStyle/>
+                    <a:p>
+                      <a:pPr latinLnBrk="1"/>
+                      <a:endParaRPr lang="ko-KR" altLang="en-US" sz="1100"/>
+                    </a:p>
+                  </a:txBody>
+                  <a:tcPr/>
+                </a:tc>
+                <a:tc>
+                  <a:txBody>
+                    <a:bodyPr/>
+                    <a:lstStyle/>
+                    <a:p>
+                      <a:pPr latinLnBrk="1"/>
+                      <a:endParaRPr lang="ko-KR" altLang="en-US" sz="1100"/>
+                    </a:p>
+                  </a:txBody>
+                  <a:tcPr/>
+                </a:tc>
+                <a:tc>
+                  <a:txBody>
+                    <a:bodyPr/>
+                    <a:lstStyle/>
+                    <a:p>
+                      <a:pPr latinLnBrk="1"/>
+                      <a:endParaRPr lang="ko-KR" altLang="en-US" sz="1100"/>
+                    </a:p>
+                  </a:txBody>
+                  <a:tcPr/>
+                </a:tc>
+                <a:extLst>
+                  <a:ext uri="{0D108BD9-81ED-4DB2-BD59-A6C34878D82A}">
+                    <a16:rowId xmlns:a16="http://schemas.microsoft.com/office/drawing/2014/main" val="3836707370"/>
+                  </a:ext>
+                </a:extLst>
+              </a:tr>
+              <a:tr h="0">
+                <a:tc>
+                  <a:txBody>
+                    <a:bodyPr/>
+                    <a:lstStyle/>
+                    <a:p>
+                      <a:pPr latinLnBrk="1"/>
+                      <a:endParaRPr lang="ko-KR" altLang="en-US" sz="1100"/>
+                    </a:p>
+                  </a:txBody>
+                  <a:tcPr/>
+                </a:tc>
+                <a:tc>
+                  <a:txBody>
+                    <a:bodyPr/>
+                    <a:lstStyle/>
+                    <a:p>
+                      <a:pPr latinLnBrk="1"/>
+                      <a:endParaRPr lang="ko-KR" altLang="en-US" sz="1100"/>
+                    </a:p>
+                  </a:txBody>
+                  <a:tcPr/>
+                </a:tc>
+                <a:tc>
+                  <a:txBody>
+                    <a:bodyPr/>
+                    <a:lstStyle/>
+                    <a:p>
+                      <a:pPr latinLnBrk="1"/>
+                      <a:endParaRPr lang="ko-KR" altLang="en-US" sz="1100"/>
+                    </a:p>
+                  </a:txBody>
+                  <a:tcPr/>
+                </a:tc>
+                <a:tc>
+                  <a:txBody>
+                    <a:bodyPr/>
+                    <a:lstStyle/>
+                    <a:p>
+                      <a:pPr latinLnBrk="1"/>
+                      <a:endParaRPr lang="ko-KR" altLang="en-US" sz="1100"/>
+                    </a:p>
+                  </a:txBody>
+                  <a:tcPr/>
+                </a:tc>
+                <a:tc>
+                  <a:txBody>
+                    <a:bodyPr/>
+                    <a:lstStyle/>
+                    <a:p>
+                      <a:pPr latinLnBrk="1"/>
+                      <a:endParaRPr lang="ko-KR" altLang="en-US" sz="1100"/>
+                    </a:p>
+                  </a:txBody>
+                  <a:tcPr/>
+                </a:tc>
+                <a:tc>
+                  <a:txBody>
+                    <a:bodyPr/>
+                    <a:lstStyle/>
+                    <a:p>
+                      <a:pPr latinLnBrk="1"/>
+                      <a:endParaRPr lang="ko-KR" altLang="en-US" sz="1100"/>
+                    </a:p>
+                  </a:txBody>
+                  <a:tcPr/>
+                </a:tc>
+                <a:tc>
+                  <a:txBody>
+                    <a:bodyPr/>
+                    <a:lstStyle/>
+                    <a:p>
+                      <a:pPr latinLnBrk="1"/>
+                      <a:endParaRPr lang="ko-KR" altLang="en-US" sz="1100"/>
+                    </a:p>
+                  </a:txBody>
+                  <a:tcPr/>
+                </a:tc>
+                <a:extLst>
+                  <a:ext uri="{0D108BD9-81ED-4DB2-BD59-A6C34878D82A}">
+                    <a16:rowId xmlns:a16="http://schemas.microsoft.com/office/drawing/2014/main" val="3896715871"/>
+                  </a:ext>
+                </a:extLst>
+              </a:tr>
+              <a:tr h="0">
+                <a:tc>
+                  <a:txBody>
+                    <a:bodyPr/>
+                    <a:lstStyle/>
+                    <a:p>
+                      <a:pPr latinLnBrk="1"/>
+                      <a:r>
+                        <a:rPr lang="ko-KR" altLang="en-US" sz="1100"/>
+                        <a:t>내부변수</a:t>
+                      </a:r>
+                    </a:p>
+                  </a:txBody>
+                  <a:tcPr/>
+                </a:tc>
+                <a:tc>
+                  <a:txBody>
+                    <a:bodyPr/>
+                    <a:lstStyle/>
+                    <a:p>
+                      <a:pPr latinLnBrk="1"/>
+                      <a:endParaRPr lang="ko-KR" altLang="en-US" sz="1100"/>
+                    </a:p>
+                  </a:txBody>
+                  <a:tcPr/>
+                </a:tc>
+                <a:tc>
+                  <a:txBody>
+                    <a:bodyPr/>
+                    <a:lstStyle/>
+                    <a:p>
+                      <a:pPr latinLnBrk="1"/>
+                      <a:endParaRPr lang="ko-KR" altLang="en-US" sz="1100"/>
+                    </a:p>
+                  </a:txBody>
+                  <a:tcPr/>
+                </a:tc>
+                <a:tc>
+                  <a:txBody>
+                    <a:bodyPr/>
+                    <a:lstStyle/>
+                    <a:p>
+                      <a:pPr latinLnBrk="1"/>
+                      <a:endParaRPr lang="ko-KR" altLang="en-US" sz="1100"/>
+                    </a:p>
+                  </a:txBody>
+                  <a:tcPr/>
+                </a:tc>
+                <a:tc>
+                  <a:txBody>
+                    <a:bodyPr/>
+                    <a:lstStyle/>
+                    <a:p>
+                      <a:pPr latinLnBrk="1"/>
+                      <a:endParaRPr lang="ko-KR" altLang="en-US" sz="1100"/>
+                    </a:p>
+                  </a:txBody>
+                  <a:tcPr/>
+                </a:tc>
+                <a:tc>
+                  <a:txBody>
+                    <a:bodyPr/>
+                    <a:lstStyle/>
+                    <a:p>
+                      <a:pPr latinLnBrk="1"/>
+                      <a:endParaRPr lang="ko-KR" altLang="en-US" sz="1100"/>
+                    </a:p>
+                  </a:txBody>
+                  <a:tcPr/>
+                </a:tc>
+                <a:tc>
+                  <a:txBody>
+                    <a:bodyPr/>
+                    <a:lstStyle/>
+                    <a:p>
+                      <a:pPr latinLnBrk="1"/>
+                      <a:endParaRPr lang="ko-KR" altLang="en-US" sz="1100"/>
+                    </a:p>
+                  </a:txBody>
+                  <a:tcPr/>
+                </a:tc>
+                <a:extLst>
+                  <a:ext uri="{0D108BD9-81ED-4DB2-BD59-A6C34878D82A}">
+                    <a16:rowId xmlns:a16="http://schemas.microsoft.com/office/drawing/2014/main" val="2801650771"/>
+                  </a:ext>
+                </a:extLst>
+              </a:tr>
+              <a:tr h="0">
+                <a:tc>
+                  <a:txBody>
+                    <a:bodyPr/>
+                    <a:lstStyle/>
+                    <a:p>
+                      <a:pPr latinLnBrk="1"/>
+                      <a:endParaRPr lang="ko-KR" altLang="en-US" sz="1100"/>
+                    </a:p>
+                  </a:txBody>
+                  <a:tcPr/>
+                </a:tc>
+                <a:tc>
+                  <a:txBody>
+                    <a:bodyPr/>
+                    <a:lstStyle/>
+                    <a:p>
+                      <a:pPr latinLnBrk="1"/>
+                      <a:endParaRPr lang="ko-KR" altLang="en-US" sz="1100"/>
+                    </a:p>
+                  </a:txBody>
+                  <a:tcPr/>
+                </a:tc>
+                <a:tc>
+                  <a:txBody>
+                    <a:bodyPr/>
+                    <a:lstStyle/>
+                    <a:p>
+                      <a:pPr latinLnBrk="1"/>
+                      <a:endParaRPr lang="ko-KR" altLang="en-US" sz="1100"/>
+                    </a:p>
+                  </a:txBody>
+                  <a:tcPr/>
+                </a:tc>
+                <a:tc>
+                  <a:txBody>
+                    <a:bodyPr/>
+                    <a:lstStyle/>
+                    <a:p>
+                      <a:pPr latinLnBrk="1"/>
+                      <a:endParaRPr lang="ko-KR" altLang="en-US" sz="1100"/>
+                    </a:p>
+                  </a:txBody>
+                  <a:tcPr/>
+                </a:tc>
+                <a:tc>
+                  <a:txBody>
+                    <a:bodyPr/>
+                    <a:lstStyle/>
+                    <a:p>
+                      <a:pPr latinLnBrk="1"/>
+                      <a:endParaRPr lang="ko-KR" altLang="en-US" sz="1100"/>
+                    </a:p>
+                  </a:txBody>
+                  <a:tcPr/>
+                </a:tc>
+                <a:tc>
+                  <a:txBody>
+                    <a:bodyPr/>
+                    <a:lstStyle/>
+                    <a:p>
+                      <a:pPr latinLnBrk="1"/>
+                      <a:endParaRPr lang="ko-KR" altLang="en-US" sz="1100"/>
+                    </a:p>
+                  </a:txBody>
+                  <a:tcPr/>
+                </a:tc>
+                <a:tc>
+                  <a:txBody>
+                    <a:bodyPr/>
+                    <a:lstStyle/>
+                    <a:p>
+                      <a:pPr latinLnBrk="1"/>
+                      <a:endParaRPr lang="ko-KR" altLang="en-US" sz="1100"/>
+                    </a:p>
+                  </a:txBody>
+                  <a:tcPr/>
+                </a:tc>
+                <a:extLst>
+                  <a:ext uri="{0D108BD9-81ED-4DB2-BD59-A6C34878D82A}">
+                    <a16:rowId xmlns:a16="http://schemas.microsoft.com/office/drawing/2014/main" val="1481591092"/>
+                  </a:ext>
+                </a:extLst>
+              </a:tr>
+            </a:tbl>
+          </a:graphicData>
+        </a:graphic>
+      </p:graphicFrame>
+    </p:spTree>
+    <p:extLst>
+      <p:ext uri="{BB962C8B-B14F-4D97-AF65-F5344CB8AC3E}">
+        <p14:creationId xmlns:p14="http://schemas.microsoft.com/office/powerpoint/2010/main" val="1912563802"/>
+      </p:ext>
+    </p:extLst>
+  </p:cSld>
+  <p:clrMapOvr>
+    <a:masterClrMapping/>
+  </p:clrMapOvr>
+</p:sld>
+</file>
+
 <file path=ppt/theme/theme1.xml><?xml version="1.0" encoding="utf-8"?>
 <a:theme xmlns:a="http://schemas.openxmlformats.org/drawingml/2006/main" name="Office 테마">
   <a:themeElements>

</xml_diff>

<commit_message>
Revert "- Check 필요 : ERROR Device 주소가 없습니다."
This reverts commit 6982d628455202ec48d233e55fa7c8b50cc61639.
</commit_message>
<xml_diff>
--- a/DsDotNet/src/UnitTest/UnitTest.Model/ImportOfficeExample/exportDS/testA/lib/dev.pptx
+++ b/DsDotNet/src/UnitTest/UnitTest.Model/ImportOfficeExample/exportDS/testA/lib/dev.pptx
@@ -7,7 +7,6 @@
   <p:sldIdLst>
     <p:sldId id="256" r:id="rId2"/>
     <p:sldId id="257" r:id="rId3"/>
-    <p:sldId id="258" r:id="rId4"/>
   </p:sldIdLst>
   <p:sldSz cx="12192000" cy="6858000"/>
   <p:notesSz cx="6858000" cy="9144000"/>
@@ -261,7 +260,7 @@
           <a:p>
             <a:fld id="{E31A602F-9409-4B9A-9D14-798E704D8577}" type="datetimeFigureOut">
               <a:rPr lang="ko-KR" altLang="en-US" smtClean="0"/>
-              <a:t>2023-11-16</a:t>
+              <a:t>2023-11-02</a:t>
             </a:fld>
             <a:endParaRPr lang="ko-KR" altLang="en-US"/>
           </a:p>
@@ -459,7 +458,7 @@
           <a:p>
             <a:fld id="{E31A602F-9409-4B9A-9D14-798E704D8577}" type="datetimeFigureOut">
               <a:rPr lang="ko-KR" altLang="en-US" smtClean="0"/>
-              <a:t>2023-11-16</a:t>
+              <a:t>2023-11-02</a:t>
             </a:fld>
             <a:endParaRPr lang="ko-KR" altLang="en-US"/>
           </a:p>
@@ -667,7 +666,7 @@
           <a:p>
             <a:fld id="{E31A602F-9409-4B9A-9D14-798E704D8577}" type="datetimeFigureOut">
               <a:rPr lang="ko-KR" altLang="en-US" smtClean="0"/>
-              <a:t>2023-11-16</a:t>
+              <a:t>2023-11-02</a:t>
             </a:fld>
             <a:endParaRPr lang="ko-KR" altLang="en-US"/>
           </a:p>
@@ -865,7 +864,7 @@
           <a:p>
             <a:fld id="{E31A602F-9409-4B9A-9D14-798E704D8577}" type="datetimeFigureOut">
               <a:rPr lang="ko-KR" altLang="en-US" smtClean="0"/>
-              <a:t>2023-11-16</a:t>
+              <a:t>2023-11-02</a:t>
             </a:fld>
             <a:endParaRPr lang="ko-KR" altLang="en-US"/>
           </a:p>
@@ -1140,7 +1139,7 @@
           <a:p>
             <a:fld id="{E31A602F-9409-4B9A-9D14-798E704D8577}" type="datetimeFigureOut">
               <a:rPr lang="ko-KR" altLang="en-US" smtClean="0"/>
-              <a:t>2023-11-16</a:t>
+              <a:t>2023-11-02</a:t>
             </a:fld>
             <a:endParaRPr lang="ko-KR" altLang="en-US"/>
           </a:p>
@@ -1405,7 +1404,7 @@
           <a:p>
             <a:fld id="{E31A602F-9409-4B9A-9D14-798E704D8577}" type="datetimeFigureOut">
               <a:rPr lang="ko-KR" altLang="en-US" smtClean="0"/>
-              <a:t>2023-11-16</a:t>
+              <a:t>2023-11-02</a:t>
             </a:fld>
             <a:endParaRPr lang="ko-KR" altLang="en-US"/>
           </a:p>
@@ -1817,7 +1816,7 @@
           <a:p>
             <a:fld id="{E31A602F-9409-4B9A-9D14-798E704D8577}" type="datetimeFigureOut">
               <a:rPr lang="ko-KR" altLang="en-US" smtClean="0"/>
-              <a:t>2023-11-16</a:t>
+              <a:t>2023-11-02</a:t>
             </a:fld>
             <a:endParaRPr lang="ko-KR" altLang="en-US"/>
           </a:p>
@@ -1958,7 +1957,7 @@
           <a:p>
             <a:fld id="{E31A602F-9409-4B9A-9D14-798E704D8577}" type="datetimeFigureOut">
               <a:rPr lang="ko-KR" altLang="en-US" smtClean="0"/>
-              <a:t>2023-11-16</a:t>
+              <a:t>2023-11-02</a:t>
             </a:fld>
             <a:endParaRPr lang="ko-KR" altLang="en-US"/>
           </a:p>
@@ -2071,7 +2070,7 @@
           <a:p>
             <a:fld id="{E31A602F-9409-4B9A-9D14-798E704D8577}" type="datetimeFigureOut">
               <a:rPr lang="ko-KR" altLang="en-US" smtClean="0"/>
-              <a:t>2023-11-16</a:t>
+              <a:t>2023-11-02</a:t>
             </a:fld>
             <a:endParaRPr lang="ko-KR" altLang="en-US"/>
           </a:p>
@@ -2382,7 +2381,7 @@
           <a:p>
             <a:fld id="{E31A602F-9409-4B9A-9D14-798E704D8577}" type="datetimeFigureOut">
               <a:rPr lang="ko-KR" altLang="en-US" smtClean="0"/>
-              <a:t>2023-11-16</a:t>
+              <a:t>2023-11-02</a:t>
             </a:fld>
             <a:endParaRPr lang="ko-KR" altLang="en-US"/>
           </a:p>
@@ -2670,7 +2669,7 @@
           <a:p>
             <a:fld id="{E31A602F-9409-4B9A-9D14-798E704D8577}" type="datetimeFigureOut">
               <a:rPr lang="ko-KR" altLang="en-US" smtClean="0"/>
-              <a:t>2023-11-16</a:t>
+              <a:t>2023-11-02</a:t>
             </a:fld>
             <a:endParaRPr lang="ko-KR" altLang="en-US"/>
           </a:p>
@@ -2911,7 +2910,7 @@
           <a:p>
             <a:fld id="{E31A602F-9409-4B9A-9D14-798E704D8577}" type="datetimeFigureOut">
               <a:rPr lang="ko-KR" altLang="en-US" smtClean="0"/>
-              <a:t>2023-11-16</a:t>
+              <a:t>2023-11-02</a:t>
             </a:fld>
             <a:endParaRPr lang="ko-KR" altLang="en-US"/>
           </a:p>
@@ -3945,1166 +3944,6 @@
 </p:sld>
 </file>
 
-<file path=ppt/slides/slide3.xml><?xml version="1.0" encoding="utf-8"?>
-<p:sld xmlns:a="http://schemas.openxmlformats.org/drawingml/2006/main" xmlns:r="http://schemas.openxmlformats.org/officeDocument/2006/relationships" xmlns:p="http://schemas.openxmlformats.org/presentationml/2006/main">
-  <p:cSld>
-    <p:bg>
-      <p:bgPr>
-        <a:solidFill>
-          <a:srgbClr val="FFFFFF"/>
-        </a:solidFill>
-        <a:effectLst/>
-      </p:bgPr>
-    </p:bg>
-    <p:spTree>
-      <p:nvGrpSpPr>
-        <p:cNvPr id="1" name=""/>
-        <p:cNvGrpSpPr/>
-        <p:nvPr/>
-      </p:nvGrpSpPr>
-      <p:grpSpPr>
-        <a:xfrm>
-          <a:off x="0" y="0"/>
-          <a:ext cx="0" cy="0"/>
-          <a:chOff x="0" y="0"/>
-          <a:chExt cx="0" cy="0"/>
-        </a:xfrm>
-      </p:grpSpPr>
-      <p:sp>
-        <p:nvSpPr>
-          <p:cNvPr id="2" name="TextBox 1">
-            <a:extLst>
-              <a:ext uri="{FF2B5EF4-FFF2-40B4-BE49-F238E27FC236}">
-                <a16:creationId xmlns:a16="http://schemas.microsoft.com/office/drawing/2014/main" id="{E53DB8F4-321C-67CD-CFBC-2129F6BAE50C}"/>
-              </a:ext>
-            </a:extLst>
-          </p:cNvPr>
-          <p:cNvSpPr txBox="1"/>
-          <p:nvPr/>
-        </p:nvSpPr>
-        <p:spPr>
-          <a:xfrm>
-            <a:off x="254000" y="254000"/>
-            <a:ext cx="1270000" cy="381000"/>
-          </a:xfrm>
-          <a:prstGeom prst="rect">
-            <a:avLst/>
-          </a:prstGeom>
-          <a:noFill/>
-        </p:spPr>
-        <p:txBody>
-          <a:bodyPr vert="horz" rtlCol="0">
-            <a:spAutoFit/>
-          </a:bodyPr>
-          <a:lstStyle/>
-          <a:p>
-            <a:r>
-              <a:rPr lang="en-US" altLang="ko-KR"/>
-              <a:t>IO TABLE</a:t>
-            </a:r>
-            <a:endParaRPr lang="ko-KR" altLang="en-US"/>
-          </a:p>
-        </p:txBody>
-      </p:sp>
-      <p:graphicFrame>
-        <p:nvGraphicFramePr>
-          <p:cNvPr id="3" name="표 2">
-            <a:extLst>
-              <a:ext uri="{FF2B5EF4-FFF2-40B4-BE49-F238E27FC236}">
-                <a16:creationId xmlns:a16="http://schemas.microsoft.com/office/drawing/2014/main" id="{69FF3AA1-4AEA-AC0D-0191-9F224EDD4D8F}"/>
-              </a:ext>
-            </a:extLst>
-          </p:cNvPr>
-          <p:cNvGraphicFramePr>
-            <a:graphicFrameLocks noGrp="1"/>
-          </p:cNvGraphicFramePr>
-          <p:nvPr>
-            <p:extLst>
-              <p:ext uri="{D42A27DB-BD31-4B8C-83A1-F6EECF244321}">
-                <p14:modId xmlns:p14="http://schemas.microsoft.com/office/powerpoint/2010/main" val="3713870498"/>
-              </p:ext>
-            </p:extLst>
-          </p:nvPr>
-        </p:nvGraphicFramePr>
-        <p:xfrm>
-          <a:off x="254000" y="635000"/>
-          <a:ext cx="11684001" cy="3916680"/>
-        </p:xfrm>
-        <a:graphic>
-          <a:graphicData uri="http://schemas.openxmlformats.org/drawingml/2006/table">
-            <a:tbl>
-              <a:tblPr firstRow="1" bandRow="1">
-                <a:tableStyleId>{5C22544A-7EE6-4342-B048-85BDC9FD1C3A}</a:tableStyleId>
-              </a:tblPr>
-              <a:tblGrid>
-                <a:gridCol w="1669143">
-                  <a:extLst>
-                    <a:ext uri="{9D8B030D-6E8A-4147-A177-3AD203B41FA5}">
-                      <a16:colId xmlns:a16="http://schemas.microsoft.com/office/drawing/2014/main" val="1560428702"/>
-                    </a:ext>
-                  </a:extLst>
-                </a:gridCol>
-                <a:gridCol w="1669143">
-                  <a:extLst>
-                    <a:ext uri="{9D8B030D-6E8A-4147-A177-3AD203B41FA5}">
-                      <a16:colId xmlns:a16="http://schemas.microsoft.com/office/drawing/2014/main" val="2322258838"/>
-                    </a:ext>
-                  </a:extLst>
-                </a:gridCol>
-                <a:gridCol w="1669143">
-                  <a:extLst>
-                    <a:ext uri="{9D8B030D-6E8A-4147-A177-3AD203B41FA5}">
-                      <a16:colId xmlns:a16="http://schemas.microsoft.com/office/drawing/2014/main" val="2209410442"/>
-                    </a:ext>
-                  </a:extLst>
-                </a:gridCol>
-                <a:gridCol w="1669143">
-                  <a:extLst>
-                    <a:ext uri="{9D8B030D-6E8A-4147-A177-3AD203B41FA5}">
-                      <a16:colId xmlns:a16="http://schemas.microsoft.com/office/drawing/2014/main" val="741026842"/>
-                    </a:ext>
-                  </a:extLst>
-                </a:gridCol>
-                <a:gridCol w="1669143">
-                  <a:extLst>
-                    <a:ext uri="{9D8B030D-6E8A-4147-A177-3AD203B41FA5}">
-                      <a16:colId xmlns:a16="http://schemas.microsoft.com/office/drawing/2014/main" val="4068080558"/>
-                    </a:ext>
-                  </a:extLst>
-                </a:gridCol>
-                <a:gridCol w="1669143">
-                  <a:extLst>
-                    <a:ext uri="{9D8B030D-6E8A-4147-A177-3AD203B41FA5}">
-                      <a16:colId xmlns:a16="http://schemas.microsoft.com/office/drawing/2014/main" val="2345341009"/>
-                    </a:ext>
-                  </a:extLst>
-                </a:gridCol>
-                <a:gridCol w="1669143">
-                  <a:extLst>
-                    <a:ext uri="{9D8B030D-6E8A-4147-A177-3AD203B41FA5}">
-                      <a16:colId xmlns:a16="http://schemas.microsoft.com/office/drawing/2014/main" val="4019820202"/>
-                    </a:ext>
-                  </a:extLst>
-                </a:gridCol>
-              </a:tblGrid>
-              <a:tr h="0">
-                <a:tc>
-                  <a:txBody>
-                    <a:bodyPr/>
-                    <a:lstStyle/>
-                    <a:p>
-                      <a:pPr latinLnBrk="1"/>
-                      <a:r>
-                        <a:rPr lang="en-US" altLang="ko-KR" sz="1100"/>
-                        <a:t>Case</a:t>
-                      </a:r>
-                      <a:endParaRPr lang="ko-KR" altLang="en-US" sz="1100"/>
-                    </a:p>
-                  </a:txBody>
-                  <a:tcPr/>
-                </a:tc>
-                <a:tc>
-                  <a:txBody>
-                    <a:bodyPr/>
-                    <a:lstStyle/>
-                    <a:p>
-                      <a:pPr latinLnBrk="1"/>
-                      <a:r>
-                        <a:rPr lang="en-US" altLang="ko-KR" sz="1100"/>
-                        <a:t>Name</a:t>
-                      </a:r>
-                      <a:endParaRPr lang="ko-KR" altLang="en-US" sz="1100"/>
-                    </a:p>
-                  </a:txBody>
-                  <a:tcPr/>
-                </a:tc>
-                <a:tc>
-                  <a:txBody>
-                    <a:bodyPr/>
-                    <a:lstStyle/>
-                    <a:p>
-                      <a:pPr latinLnBrk="1"/>
-                      <a:r>
-                        <a:rPr lang="en-US" altLang="ko-KR" sz="1100"/>
-                        <a:t>DataType</a:t>
-                      </a:r>
-                      <a:endParaRPr lang="ko-KR" altLang="en-US" sz="1100"/>
-                    </a:p>
-                  </a:txBody>
-                  <a:tcPr/>
-                </a:tc>
-                <a:tc>
-                  <a:txBody>
-                    <a:bodyPr/>
-                    <a:lstStyle/>
-                    <a:p>
-                      <a:pPr latinLnBrk="1"/>
-                      <a:r>
-                        <a:rPr lang="en-US" altLang="ko-KR" sz="1100"/>
-                        <a:t>Input</a:t>
-                      </a:r>
-                      <a:endParaRPr lang="ko-KR" altLang="en-US" sz="1100"/>
-                    </a:p>
-                  </a:txBody>
-                  <a:tcPr/>
-                </a:tc>
-                <a:tc>
-                  <a:txBody>
-                    <a:bodyPr/>
-                    <a:lstStyle/>
-                    <a:p>
-                      <a:pPr latinLnBrk="1"/>
-                      <a:r>
-                        <a:rPr lang="en-US" altLang="ko-KR" sz="1100"/>
-                        <a:t>Output</a:t>
-                      </a:r>
-                      <a:endParaRPr lang="ko-KR" altLang="en-US" sz="1100"/>
-                    </a:p>
-                  </a:txBody>
-                  <a:tcPr/>
-                </a:tc>
-                <a:tc>
-                  <a:txBody>
-                    <a:bodyPr/>
-                    <a:lstStyle/>
-                    <a:p>
-                      <a:pPr latinLnBrk="1"/>
-                      <a:r>
-                        <a:rPr lang="en-US" altLang="ko-KR" sz="1100"/>
-                        <a:t>Job</a:t>
-                      </a:r>
-                      <a:endParaRPr lang="ko-KR" altLang="en-US" sz="1100"/>
-                    </a:p>
-                  </a:txBody>
-                  <a:tcPr/>
-                </a:tc>
-                <a:tc>
-                  <a:txBody>
-                    <a:bodyPr/>
-                    <a:lstStyle/>
-                    <a:p>
-                      <a:pPr latinLnBrk="1"/>
-                      <a:r>
-                        <a:rPr lang="en-US" altLang="ko-KR" sz="1100"/>
-                        <a:t>Func</a:t>
-                      </a:r>
-                      <a:endParaRPr lang="ko-KR" altLang="en-US" sz="1100"/>
-                    </a:p>
-                  </a:txBody>
-                  <a:tcPr/>
-                </a:tc>
-                <a:extLst>
-                  <a:ext uri="{0D108BD9-81ED-4DB2-BD59-A6C34878D82A}">
-                    <a16:rowId xmlns:a16="http://schemas.microsoft.com/office/drawing/2014/main" val="2063689300"/>
-                  </a:ext>
-                </a:extLst>
-              </a:tr>
-              <a:tr h="0">
-                <a:tc>
-                  <a:txBody>
-                    <a:bodyPr/>
-                    <a:lstStyle/>
-                    <a:p>
-                      <a:pPr latinLnBrk="1"/>
-                      <a:r>
-                        <a:rPr lang="ko-KR" altLang="en-US" sz="1100"/>
-                        <a:t>외부주소</a:t>
-                      </a:r>
-                    </a:p>
-                  </a:txBody>
-                  <a:tcPr/>
-                </a:tc>
-                <a:tc>
-                  <a:txBody>
-                    <a:bodyPr/>
-                    <a:lstStyle/>
-                    <a:p>
-                      <a:pPr latinLnBrk="1"/>
-                      <a:r>
-                        <a:rPr lang="en-US" altLang="ko-KR" sz="1100"/>
-                        <a:t>F2_CLP."+"</a:t>
-                      </a:r>
-                      <a:endParaRPr lang="ko-KR" altLang="en-US" sz="1100"/>
-                    </a:p>
-                  </a:txBody>
-                  <a:tcPr/>
-                </a:tc>
-                <a:tc>
-                  <a:txBody>
-                    <a:bodyPr/>
-                    <a:lstStyle/>
-                    <a:p>
-                      <a:pPr latinLnBrk="1"/>
-                      <a:r>
-                        <a:rPr lang="en-US" altLang="ko-KR" sz="1100"/>
-                        <a:t>bool</a:t>
-                      </a:r>
-                      <a:endParaRPr lang="ko-KR" altLang="en-US" sz="1100"/>
-                    </a:p>
-                  </a:txBody>
-                  <a:tcPr/>
-                </a:tc>
-                <a:tc>
-                  <a:txBody>
-                    <a:bodyPr/>
-                    <a:lstStyle/>
-                    <a:p>
-                      <a:pPr latinLnBrk="1"/>
-                      <a:r>
-                        <a:rPr lang="en-US" altLang="ko-KR" sz="1100"/>
-                        <a:t>I625.1</a:t>
-                      </a:r>
-                      <a:endParaRPr lang="ko-KR" altLang="en-US" sz="1100"/>
-                    </a:p>
-                  </a:txBody>
-                  <a:tcPr/>
-                </a:tc>
-                <a:tc>
-                  <a:txBody>
-                    <a:bodyPr/>
-                    <a:lstStyle/>
-                    <a:p>
-                      <a:pPr latinLnBrk="1"/>
-                      <a:r>
-                        <a:rPr lang="en-US" altLang="ko-KR" sz="1100"/>
-                        <a:t>O625.1</a:t>
-                      </a:r>
-                      <a:endParaRPr lang="ko-KR" altLang="en-US" sz="1100"/>
-                    </a:p>
-                  </a:txBody>
-                  <a:tcPr/>
-                </a:tc>
-                <a:tc>
-                  <a:txBody>
-                    <a:bodyPr/>
-                    <a:lstStyle/>
-                    <a:p>
-                      <a:pPr latinLnBrk="1"/>
-                      <a:r>
-                        <a:rPr lang="en-US" altLang="ko-KR" sz="1100"/>
-                        <a:t>F2_CLP_+</a:t>
-                      </a:r>
-                      <a:endParaRPr lang="ko-KR" altLang="en-US" sz="1100"/>
-                    </a:p>
-                  </a:txBody>
-                  <a:tcPr/>
-                </a:tc>
-                <a:tc>
-                  <a:txBody>
-                    <a:bodyPr/>
-                    <a:lstStyle/>
-                    <a:p>
-                      <a:pPr latinLnBrk="1"/>
-                      <a:endParaRPr lang="ko-KR" altLang="en-US" sz="1100"/>
-                    </a:p>
-                  </a:txBody>
-                  <a:tcPr/>
-                </a:tc>
-                <a:extLst>
-                  <a:ext uri="{0D108BD9-81ED-4DB2-BD59-A6C34878D82A}">
-                    <a16:rowId xmlns:a16="http://schemas.microsoft.com/office/drawing/2014/main" val="3014701424"/>
-                  </a:ext>
-                </a:extLst>
-              </a:tr>
-              <a:tr h="0">
-                <a:tc>
-                  <a:txBody>
-                    <a:bodyPr/>
-                    <a:lstStyle/>
-                    <a:p>
-                      <a:pPr latinLnBrk="1"/>
-                      <a:r>
-                        <a:rPr lang="ko-KR" altLang="en-US" sz="1100"/>
-                        <a:t>외부주소</a:t>
-                      </a:r>
-                    </a:p>
-                  </a:txBody>
-                  <a:tcPr/>
-                </a:tc>
-                <a:tc>
-                  <a:txBody>
-                    <a:bodyPr/>
-                    <a:lstStyle/>
-                    <a:p>
-                      <a:pPr latinLnBrk="1"/>
-                      <a:r>
-                        <a:rPr lang="en-US" altLang="ko-KR" sz="1100"/>
-                        <a:t>F2_CLP."-"</a:t>
-                      </a:r>
-                      <a:endParaRPr lang="ko-KR" altLang="en-US" sz="1100"/>
-                    </a:p>
-                  </a:txBody>
-                  <a:tcPr/>
-                </a:tc>
-                <a:tc>
-                  <a:txBody>
-                    <a:bodyPr/>
-                    <a:lstStyle/>
-                    <a:p>
-                      <a:pPr latinLnBrk="1"/>
-                      <a:r>
-                        <a:rPr lang="en-US" altLang="ko-KR" sz="1100"/>
-                        <a:t>bool</a:t>
-                      </a:r>
-                      <a:endParaRPr lang="ko-KR" altLang="en-US" sz="1100"/>
-                    </a:p>
-                  </a:txBody>
-                  <a:tcPr/>
-                </a:tc>
-                <a:tc>
-                  <a:txBody>
-                    <a:bodyPr/>
-                    <a:lstStyle/>
-                    <a:p>
-                      <a:pPr latinLnBrk="1"/>
-                      <a:r>
-                        <a:rPr lang="en-US" altLang="ko-KR" sz="1100"/>
-                        <a:t>I625.2</a:t>
-                      </a:r>
-                      <a:endParaRPr lang="ko-KR" altLang="en-US" sz="1100"/>
-                    </a:p>
-                  </a:txBody>
-                  <a:tcPr/>
-                </a:tc>
-                <a:tc>
-                  <a:txBody>
-                    <a:bodyPr/>
-                    <a:lstStyle/>
-                    <a:p>
-                      <a:pPr latinLnBrk="1"/>
-                      <a:r>
-                        <a:rPr lang="en-US" altLang="ko-KR" sz="1100"/>
-                        <a:t>O625.2</a:t>
-                      </a:r>
-                      <a:endParaRPr lang="ko-KR" altLang="en-US" sz="1100"/>
-                    </a:p>
-                  </a:txBody>
-                  <a:tcPr/>
-                </a:tc>
-                <a:tc>
-                  <a:txBody>
-                    <a:bodyPr/>
-                    <a:lstStyle/>
-                    <a:p>
-                      <a:pPr latinLnBrk="1"/>
-                      <a:r>
-                        <a:rPr lang="en-US" altLang="ko-KR" sz="1100"/>
-                        <a:t>F2_CLP_-</a:t>
-                      </a:r>
-                      <a:endParaRPr lang="ko-KR" altLang="en-US" sz="1100"/>
-                    </a:p>
-                  </a:txBody>
-                  <a:tcPr/>
-                </a:tc>
-                <a:tc>
-                  <a:txBody>
-                    <a:bodyPr/>
-                    <a:lstStyle/>
-                    <a:p>
-                      <a:pPr latinLnBrk="1"/>
-                      <a:endParaRPr lang="ko-KR" altLang="en-US" sz="1100"/>
-                    </a:p>
-                  </a:txBody>
-                  <a:tcPr/>
-                </a:tc>
-                <a:extLst>
-                  <a:ext uri="{0D108BD9-81ED-4DB2-BD59-A6C34878D82A}">
-                    <a16:rowId xmlns:a16="http://schemas.microsoft.com/office/drawing/2014/main" val="2658622021"/>
-                  </a:ext>
-                </a:extLst>
-              </a:tr>
-              <a:tr h="0">
-                <a:tc>
-                  <a:txBody>
-                    <a:bodyPr/>
-                    <a:lstStyle/>
-                    <a:p>
-                      <a:pPr latinLnBrk="1"/>
-                      <a:endParaRPr lang="ko-KR" altLang="en-US" sz="1100"/>
-                    </a:p>
-                  </a:txBody>
-                  <a:tcPr/>
-                </a:tc>
-                <a:tc>
-                  <a:txBody>
-                    <a:bodyPr/>
-                    <a:lstStyle/>
-                    <a:p>
-                      <a:pPr latinLnBrk="1"/>
-                      <a:endParaRPr lang="ko-KR" altLang="en-US" sz="1100"/>
-                    </a:p>
-                  </a:txBody>
-                  <a:tcPr/>
-                </a:tc>
-                <a:tc>
-                  <a:txBody>
-                    <a:bodyPr/>
-                    <a:lstStyle/>
-                    <a:p>
-                      <a:pPr latinLnBrk="1"/>
-                      <a:endParaRPr lang="ko-KR" altLang="en-US" sz="1100"/>
-                    </a:p>
-                  </a:txBody>
-                  <a:tcPr/>
-                </a:tc>
-                <a:tc>
-                  <a:txBody>
-                    <a:bodyPr/>
-                    <a:lstStyle/>
-                    <a:p>
-                      <a:pPr latinLnBrk="1"/>
-                      <a:endParaRPr lang="ko-KR" altLang="en-US" sz="1100"/>
-                    </a:p>
-                  </a:txBody>
-                  <a:tcPr/>
-                </a:tc>
-                <a:tc>
-                  <a:txBody>
-                    <a:bodyPr/>
-                    <a:lstStyle/>
-                    <a:p>
-                      <a:pPr latinLnBrk="1"/>
-                      <a:endParaRPr lang="ko-KR" altLang="en-US" sz="1100"/>
-                    </a:p>
-                  </a:txBody>
-                  <a:tcPr/>
-                </a:tc>
-                <a:tc>
-                  <a:txBody>
-                    <a:bodyPr/>
-                    <a:lstStyle/>
-                    <a:p>
-                      <a:pPr latinLnBrk="1"/>
-                      <a:endParaRPr lang="ko-KR" altLang="en-US" sz="1100"/>
-                    </a:p>
-                  </a:txBody>
-                  <a:tcPr/>
-                </a:tc>
-                <a:tc>
-                  <a:txBody>
-                    <a:bodyPr/>
-                    <a:lstStyle/>
-                    <a:p>
-                      <a:pPr latinLnBrk="1"/>
-                      <a:endParaRPr lang="ko-KR" altLang="en-US" sz="1100"/>
-                    </a:p>
-                  </a:txBody>
-                  <a:tcPr/>
-                </a:tc>
-                <a:extLst>
-                  <a:ext uri="{0D108BD9-81ED-4DB2-BD59-A6C34878D82A}">
-                    <a16:rowId xmlns:a16="http://schemas.microsoft.com/office/drawing/2014/main" val="3479657772"/>
-                  </a:ext>
-                </a:extLst>
-              </a:tr>
-              <a:tr h="0">
-                <a:tc>
-                  <a:txBody>
-                    <a:bodyPr/>
-                    <a:lstStyle/>
-                    <a:p>
-                      <a:pPr latinLnBrk="1"/>
-                      <a:endParaRPr lang="ko-KR" altLang="en-US" sz="1100"/>
-                    </a:p>
-                  </a:txBody>
-                  <a:tcPr/>
-                </a:tc>
-                <a:tc>
-                  <a:txBody>
-                    <a:bodyPr/>
-                    <a:lstStyle/>
-                    <a:p>
-                      <a:pPr latinLnBrk="1"/>
-                      <a:endParaRPr lang="ko-KR" altLang="en-US" sz="1100"/>
-                    </a:p>
-                  </a:txBody>
-                  <a:tcPr/>
-                </a:tc>
-                <a:tc>
-                  <a:txBody>
-                    <a:bodyPr/>
-                    <a:lstStyle/>
-                    <a:p>
-                      <a:pPr latinLnBrk="1"/>
-                      <a:endParaRPr lang="ko-KR" altLang="en-US" sz="1100"/>
-                    </a:p>
-                  </a:txBody>
-                  <a:tcPr/>
-                </a:tc>
-                <a:tc>
-                  <a:txBody>
-                    <a:bodyPr/>
-                    <a:lstStyle/>
-                    <a:p>
-                      <a:pPr latinLnBrk="1"/>
-                      <a:endParaRPr lang="ko-KR" altLang="en-US" sz="1100"/>
-                    </a:p>
-                  </a:txBody>
-                  <a:tcPr/>
-                </a:tc>
-                <a:tc>
-                  <a:txBody>
-                    <a:bodyPr/>
-                    <a:lstStyle/>
-                    <a:p>
-                      <a:pPr latinLnBrk="1"/>
-                      <a:endParaRPr lang="ko-KR" altLang="en-US" sz="1100"/>
-                    </a:p>
-                  </a:txBody>
-                  <a:tcPr/>
-                </a:tc>
-                <a:tc>
-                  <a:txBody>
-                    <a:bodyPr/>
-                    <a:lstStyle/>
-                    <a:p>
-                      <a:pPr latinLnBrk="1"/>
-                      <a:endParaRPr lang="ko-KR" altLang="en-US" sz="1100"/>
-                    </a:p>
-                  </a:txBody>
-                  <a:tcPr/>
-                </a:tc>
-                <a:tc>
-                  <a:txBody>
-                    <a:bodyPr/>
-                    <a:lstStyle/>
-                    <a:p>
-                      <a:pPr latinLnBrk="1"/>
-                      <a:endParaRPr lang="ko-KR" altLang="en-US" sz="1100"/>
-                    </a:p>
-                  </a:txBody>
-                  <a:tcPr/>
-                </a:tc>
-                <a:extLst>
-                  <a:ext uri="{0D108BD9-81ED-4DB2-BD59-A6C34878D82A}">
-                    <a16:rowId xmlns:a16="http://schemas.microsoft.com/office/drawing/2014/main" val="4106308594"/>
-                  </a:ext>
-                </a:extLst>
-              </a:tr>
-              <a:tr h="0">
-                <a:tc>
-                  <a:txBody>
-                    <a:bodyPr/>
-                    <a:lstStyle/>
-                    <a:p>
-                      <a:pPr latinLnBrk="1"/>
-                      <a:endParaRPr lang="ko-KR" altLang="en-US" sz="1100"/>
-                    </a:p>
-                  </a:txBody>
-                  <a:tcPr/>
-                </a:tc>
-                <a:tc>
-                  <a:txBody>
-                    <a:bodyPr/>
-                    <a:lstStyle/>
-                    <a:p>
-                      <a:pPr latinLnBrk="1"/>
-                      <a:endParaRPr lang="ko-KR" altLang="en-US" sz="1100"/>
-                    </a:p>
-                  </a:txBody>
-                  <a:tcPr/>
-                </a:tc>
-                <a:tc>
-                  <a:txBody>
-                    <a:bodyPr/>
-                    <a:lstStyle/>
-                    <a:p>
-                      <a:pPr latinLnBrk="1"/>
-                      <a:endParaRPr lang="ko-KR" altLang="en-US" sz="1100"/>
-                    </a:p>
-                  </a:txBody>
-                  <a:tcPr/>
-                </a:tc>
-                <a:tc>
-                  <a:txBody>
-                    <a:bodyPr/>
-                    <a:lstStyle/>
-                    <a:p>
-                      <a:pPr latinLnBrk="1"/>
-                      <a:endParaRPr lang="ko-KR" altLang="en-US" sz="1100"/>
-                    </a:p>
-                  </a:txBody>
-                  <a:tcPr/>
-                </a:tc>
-                <a:tc>
-                  <a:txBody>
-                    <a:bodyPr/>
-                    <a:lstStyle/>
-                    <a:p>
-                      <a:pPr latinLnBrk="1"/>
-                      <a:endParaRPr lang="ko-KR" altLang="en-US" sz="1100"/>
-                    </a:p>
-                  </a:txBody>
-                  <a:tcPr/>
-                </a:tc>
-                <a:tc>
-                  <a:txBody>
-                    <a:bodyPr/>
-                    <a:lstStyle/>
-                    <a:p>
-                      <a:pPr latinLnBrk="1"/>
-                      <a:endParaRPr lang="ko-KR" altLang="en-US" sz="1100"/>
-                    </a:p>
-                  </a:txBody>
-                  <a:tcPr/>
-                </a:tc>
-                <a:tc>
-                  <a:txBody>
-                    <a:bodyPr/>
-                    <a:lstStyle/>
-                    <a:p>
-                      <a:pPr latinLnBrk="1"/>
-                      <a:endParaRPr lang="ko-KR" altLang="en-US" sz="1100"/>
-                    </a:p>
-                  </a:txBody>
-                  <a:tcPr/>
-                </a:tc>
-                <a:extLst>
-                  <a:ext uri="{0D108BD9-81ED-4DB2-BD59-A6C34878D82A}">
-                    <a16:rowId xmlns:a16="http://schemas.microsoft.com/office/drawing/2014/main" val="1336343278"/>
-                  </a:ext>
-                </a:extLst>
-              </a:tr>
-              <a:tr h="0">
-                <a:tc>
-                  <a:txBody>
-                    <a:bodyPr/>
-                    <a:lstStyle/>
-                    <a:p>
-                      <a:pPr latinLnBrk="1"/>
-                      <a:endParaRPr lang="ko-KR" altLang="en-US" sz="1100"/>
-                    </a:p>
-                  </a:txBody>
-                  <a:tcPr/>
-                </a:tc>
-                <a:tc>
-                  <a:txBody>
-                    <a:bodyPr/>
-                    <a:lstStyle/>
-                    <a:p>
-                      <a:pPr latinLnBrk="1"/>
-                      <a:endParaRPr lang="ko-KR" altLang="en-US" sz="1100"/>
-                    </a:p>
-                  </a:txBody>
-                  <a:tcPr/>
-                </a:tc>
-                <a:tc>
-                  <a:txBody>
-                    <a:bodyPr/>
-                    <a:lstStyle/>
-                    <a:p>
-                      <a:pPr latinLnBrk="1"/>
-                      <a:endParaRPr lang="ko-KR" altLang="en-US" sz="1100"/>
-                    </a:p>
-                  </a:txBody>
-                  <a:tcPr/>
-                </a:tc>
-                <a:tc>
-                  <a:txBody>
-                    <a:bodyPr/>
-                    <a:lstStyle/>
-                    <a:p>
-                      <a:pPr latinLnBrk="1"/>
-                      <a:endParaRPr lang="ko-KR" altLang="en-US" sz="1100"/>
-                    </a:p>
-                  </a:txBody>
-                  <a:tcPr/>
-                </a:tc>
-                <a:tc>
-                  <a:txBody>
-                    <a:bodyPr/>
-                    <a:lstStyle/>
-                    <a:p>
-                      <a:pPr latinLnBrk="1"/>
-                      <a:endParaRPr lang="ko-KR" altLang="en-US" sz="1100"/>
-                    </a:p>
-                  </a:txBody>
-                  <a:tcPr/>
-                </a:tc>
-                <a:tc>
-                  <a:txBody>
-                    <a:bodyPr/>
-                    <a:lstStyle/>
-                    <a:p>
-                      <a:pPr latinLnBrk="1"/>
-                      <a:endParaRPr lang="ko-KR" altLang="en-US" sz="1100"/>
-                    </a:p>
-                  </a:txBody>
-                  <a:tcPr/>
-                </a:tc>
-                <a:tc>
-                  <a:txBody>
-                    <a:bodyPr/>
-                    <a:lstStyle/>
-                    <a:p>
-                      <a:pPr latinLnBrk="1"/>
-                      <a:endParaRPr lang="ko-KR" altLang="en-US" sz="1100"/>
-                    </a:p>
-                  </a:txBody>
-                  <a:tcPr/>
-                </a:tc>
-                <a:extLst>
-                  <a:ext uri="{0D108BD9-81ED-4DB2-BD59-A6C34878D82A}">
-                    <a16:rowId xmlns:a16="http://schemas.microsoft.com/office/drawing/2014/main" val="3759111006"/>
-                  </a:ext>
-                </a:extLst>
-              </a:tr>
-              <a:tr h="0">
-                <a:tc>
-                  <a:txBody>
-                    <a:bodyPr/>
-                    <a:lstStyle/>
-                    <a:p>
-                      <a:pPr latinLnBrk="1"/>
-                      <a:endParaRPr lang="ko-KR" altLang="en-US" sz="1100"/>
-                    </a:p>
-                  </a:txBody>
-                  <a:tcPr/>
-                </a:tc>
-                <a:tc>
-                  <a:txBody>
-                    <a:bodyPr/>
-                    <a:lstStyle/>
-                    <a:p>
-                      <a:pPr latinLnBrk="1"/>
-                      <a:endParaRPr lang="ko-KR" altLang="en-US" sz="1100"/>
-                    </a:p>
-                  </a:txBody>
-                  <a:tcPr/>
-                </a:tc>
-                <a:tc>
-                  <a:txBody>
-                    <a:bodyPr/>
-                    <a:lstStyle/>
-                    <a:p>
-                      <a:pPr latinLnBrk="1"/>
-                      <a:endParaRPr lang="ko-KR" altLang="en-US" sz="1100"/>
-                    </a:p>
-                  </a:txBody>
-                  <a:tcPr/>
-                </a:tc>
-                <a:tc>
-                  <a:txBody>
-                    <a:bodyPr/>
-                    <a:lstStyle/>
-                    <a:p>
-                      <a:pPr latinLnBrk="1"/>
-                      <a:endParaRPr lang="ko-KR" altLang="en-US" sz="1100"/>
-                    </a:p>
-                  </a:txBody>
-                  <a:tcPr/>
-                </a:tc>
-                <a:tc>
-                  <a:txBody>
-                    <a:bodyPr/>
-                    <a:lstStyle/>
-                    <a:p>
-                      <a:pPr latinLnBrk="1"/>
-                      <a:endParaRPr lang="ko-KR" altLang="en-US" sz="1100"/>
-                    </a:p>
-                  </a:txBody>
-                  <a:tcPr/>
-                </a:tc>
-                <a:tc>
-                  <a:txBody>
-                    <a:bodyPr/>
-                    <a:lstStyle/>
-                    <a:p>
-                      <a:pPr latinLnBrk="1"/>
-                      <a:endParaRPr lang="ko-KR" altLang="en-US" sz="1100"/>
-                    </a:p>
-                  </a:txBody>
-                  <a:tcPr/>
-                </a:tc>
-                <a:tc>
-                  <a:txBody>
-                    <a:bodyPr/>
-                    <a:lstStyle/>
-                    <a:p>
-                      <a:pPr latinLnBrk="1"/>
-                      <a:endParaRPr lang="ko-KR" altLang="en-US" sz="1100"/>
-                    </a:p>
-                  </a:txBody>
-                  <a:tcPr/>
-                </a:tc>
-                <a:extLst>
-                  <a:ext uri="{0D108BD9-81ED-4DB2-BD59-A6C34878D82A}">
-                    <a16:rowId xmlns:a16="http://schemas.microsoft.com/office/drawing/2014/main" val="3836707370"/>
-                  </a:ext>
-                </a:extLst>
-              </a:tr>
-              <a:tr h="0">
-                <a:tc>
-                  <a:txBody>
-                    <a:bodyPr/>
-                    <a:lstStyle/>
-                    <a:p>
-                      <a:pPr latinLnBrk="1"/>
-                      <a:endParaRPr lang="ko-KR" altLang="en-US" sz="1100"/>
-                    </a:p>
-                  </a:txBody>
-                  <a:tcPr/>
-                </a:tc>
-                <a:tc>
-                  <a:txBody>
-                    <a:bodyPr/>
-                    <a:lstStyle/>
-                    <a:p>
-                      <a:pPr latinLnBrk="1"/>
-                      <a:endParaRPr lang="ko-KR" altLang="en-US" sz="1100"/>
-                    </a:p>
-                  </a:txBody>
-                  <a:tcPr/>
-                </a:tc>
-                <a:tc>
-                  <a:txBody>
-                    <a:bodyPr/>
-                    <a:lstStyle/>
-                    <a:p>
-                      <a:pPr latinLnBrk="1"/>
-                      <a:endParaRPr lang="ko-KR" altLang="en-US" sz="1100"/>
-                    </a:p>
-                  </a:txBody>
-                  <a:tcPr/>
-                </a:tc>
-                <a:tc>
-                  <a:txBody>
-                    <a:bodyPr/>
-                    <a:lstStyle/>
-                    <a:p>
-                      <a:pPr latinLnBrk="1"/>
-                      <a:endParaRPr lang="ko-KR" altLang="en-US" sz="1100"/>
-                    </a:p>
-                  </a:txBody>
-                  <a:tcPr/>
-                </a:tc>
-                <a:tc>
-                  <a:txBody>
-                    <a:bodyPr/>
-                    <a:lstStyle/>
-                    <a:p>
-                      <a:pPr latinLnBrk="1"/>
-                      <a:endParaRPr lang="ko-KR" altLang="en-US" sz="1100"/>
-                    </a:p>
-                  </a:txBody>
-                  <a:tcPr/>
-                </a:tc>
-                <a:tc>
-                  <a:txBody>
-                    <a:bodyPr/>
-                    <a:lstStyle/>
-                    <a:p>
-                      <a:pPr latinLnBrk="1"/>
-                      <a:endParaRPr lang="ko-KR" altLang="en-US" sz="1100"/>
-                    </a:p>
-                  </a:txBody>
-                  <a:tcPr/>
-                </a:tc>
-                <a:tc>
-                  <a:txBody>
-                    <a:bodyPr/>
-                    <a:lstStyle/>
-                    <a:p>
-                      <a:pPr latinLnBrk="1"/>
-                      <a:endParaRPr lang="ko-KR" altLang="en-US" sz="1100"/>
-                    </a:p>
-                  </a:txBody>
-                  <a:tcPr/>
-                </a:tc>
-                <a:extLst>
-                  <a:ext uri="{0D108BD9-81ED-4DB2-BD59-A6C34878D82A}">
-                    <a16:rowId xmlns:a16="http://schemas.microsoft.com/office/drawing/2014/main" val="3896715871"/>
-                  </a:ext>
-                </a:extLst>
-              </a:tr>
-              <a:tr h="0">
-                <a:tc>
-                  <a:txBody>
-                    <a:bodyPr/>
-                    <a:lstStyle/>
-                    <a:p>
-                      <a:pPr latinLnBrk="1"/>
-                      <a:r>
-                        <a:rPr lang="ko-KR" altLang="en-US" sz="1100"/>
-                        <a:t>내부변수</a:t>
-                      </a:r>
-                    </a:p>
-                  </a:txBody>
-                  <a:tcPr/>
-                </a:tc>
-                <a:tc>
-                  <a:txBody>
-                    <a:bodyPr/>
-                    <a:lstStyle/>
-                    <a:p>
-                      <a:pPr latinLnBrk="1"/>
-                      <a:endParaRPr lang="ko-KR" altLang="en-US" sz="1100"/>
-                    </a:p>
-                  </a:txBody>
-                  <a:tcPr/>
-                </a:tc>
-                <a:tc>
-                  <a:txBody>
-                    <a:bodyPr/>
-                    <a:lstStyle/>
-                    <a:p>
-                      <a:pPr latinLnBrk="1"/>
-                      <a:endParaRPr lang="ko-KR" altLang="en-US" sz="1100"/>
-                    </a:p>
-                  </a:txBody>
-                  <a:tcPr/>
-                </a:tc>
-                <a:tc>
-                  <a:txBody>
-                    <a:bodyPr/>
-                    <a:lstStyle/>
-                    <a:p>
-                      <a:pPr latinLnBrk="1"/>
-                      <a:endParaRPr lang="ko-KR" altLang="en-US" sz="1100"/>
-                    </a:p>
-                  </a:txBody>
-                  <a:tcPr/>
-                </a:tc>
-                <a:tc>
-                  <a:txBody>
-                    <a:bodyPr/>
-                    <a:lstStyle/>
-                    <a:p>
-                      <a:pPr latinLnBrk="1"/>
-                      <a:endParaRPr lang="ko-KR" altLang="en-US" sz="1100"/>
-                    </a:p>
-                  </a:txBody>
-                  <a:tcPr/>
-                </a:tc>
-                <a:tc>
-                  <a:txBody>
-                    <a:bodyPr/>
-                    <a:lstStyle/>
-                    <a:p>
-                      <a:pPr latinLnBrk="1"/>
-                      <a:endParaRPr lang="ko-KR" altLang="en-US" sz="1100"/>
-                    </a:p>
-                  </a:txBody>
-                  <a:tcPr/>
-                </a:tc>
-                <a:tc>
-                  <a:txBody>
-                    <a:bodyPr/>
-                    <a:lstStyle/>
-                    <a:p>
-                      <a:pPr latinLnBrk="1"/>
-                      <a:endParaRPr lang="ko-KR" altLang="en-US" sz="1100"/>
-                    </a:p>
-                  </a:txBody>
-                  <a:tcPr/>
-                </a:tc>
-                <a:extLst>
-                  <a:ext uri="{0D108BD9-81ED-4DB2-BD59-A6C34878D82A}">
-                    <a16:rowId xmlns:a16="http://schemas.microsoft.com/office/drawing/2014/main" val="2801650771"/>
-                  </a:ext>
-                </a:extLst>
-              </a:tr>
-              <a:tr h="0">
-                <a:tc>
-                  <a:txBody>
-                    <a:bodyPr/>
-                    <a:lstStyle/>
-                    <a:p>
-                      <a:pPr latinLnBrk="1"/>
-                      <a:endParaRPr lang="ko-KR" altLang="en-US" sz="1100"/>
-                    </a:p>
-                  </a:txBody>
-                  <a:tcPr/>
-                </a:tc>
-                <a:tc>
-                  <a:txBody>
-                    <a:bodyPr/>
-                    <a:lstStyle/>
-                    <a:p>
-                      <a:pPr latinLnBrk="1"/>
-                      <a:endParaRPr lang="ko-KR" altLang="en-US" sz="1100"/>
-                    </a:p>
-                  </a:txBody>
-                  <a:tcPr/>
-                </a:tc>
-                <a:tc>
-                  <a:txBody>
-                    <a:bodyPr/>
-                    <a:lstStyle/>
-                    <a:p>
-                      <a:pPr latinLnBrk="1"/>
-                      <a:endParaRPr lang="ko-KR" altLang="en-US" sz="1100"/>
-                    </a:p>
-                  </a:txBody>
-                  <a:tcPr/>
-                </a:tc>
-                <a:tc>
-                  <a:txBody>
-                    <a:bodyPr/>
-                    <a:lstStyle/>
-                    <a:p>
-                      <a:pPr latinLnBrk="1"/>
-                      <a:endParaRPr lang="ko-KR" altLang="en-US" sz="1100"/>
-                    </a:p>
-                  </a:txBody>
-                  <a:tcPr/>
-                </a:tc>
-                <a:tc>
-                  <a:txBody>
-                    <a:bodyPr/>
-                    <a:lstStyle/>
-                    <a:p>
-                      <a:pPr latinLnBrk="1"/>
-                      <a:endParaRPr lang="ko-KR" altLang="en-US" sz="1100"/>
-                    </a:p>
-                  </a:txBody>
-                  <a:tcPr/>
-                </a:tc>
-                <a:tc>
-                  <a:txBody>
-                    <a:bodyPr/>
-                    <a:lstStyle/>
-                    <a:p>
-                      <a:pPr latinLnBrk="1"/>
-                      <a:endParaRPr lang="ko-KR" altLang="en-US" sz="1100"/>
-                    </a:p>
-                  </a:txBody>
-                  <a:tcPr/>
-                </a:tc>
-                <a:tc>
-                  <a:txBody>
-                    <a:bodyPr/>
-                    <a:lstStyle/>
-                    <a:p>
-                      <a:pPr latinLnBrk="1"/>
-                      <a:endParaRPr lang="ko-KR" altLang="en-US" sz="1100"/>
-                    </a:p>
-                  </a:txBody>
-                  <a:tcPr/>
-                </a:tc>
-                <a:extLst>
-                  <a:ext uri="{0D108BD9-81ED-4DB2-BD59-A6C34878D82A}">
-                    <a16:rowId xmlns:a16="http://schemas.microsoft.com/office/drawing/2014/main" val="1481591092"/>
-                  </a:ext>
-                </a:extLst>
-              </a:tr>
-            </a:tbl>
-          </a:graphicData>
-        </a:graphic>
-      </p:graphicFrame>
-    </p:spTree>
-    <p:extLst>
-      <p:ext uri="{BB962C8B-B14F-4D97-AF65-F5344CB8AC3E}">
-        <p14:creationId xmlns:p14="http://schemas.microsoft.com/office/powerpoint/2010/main" val="1912563802"/>
-      </p:ext>
-    </p:extLst>
-  </p:cSld>
-  <p:clrMapOvr>
-    <a:masterClrMapping/>
-  </p:clrMapOvr>
-</p:sld>
-</file>
-
 <file path=ppt/theme/theme1.xml><?xml version="1.0" encoding="utf-8"?>
 <a:theme xmlns:a="http://schemas.openxmlformats.org/drawingml/2006/main" name="Office 테마">
   <a:themeElements>

</xml_diff>